<commit_message>
Updated slides and project
</commit_message>
<xml_diff>
--- a/slides/Apache Spark Bootcamp.pptx
+++ b/slides/Apache Spark Bootcamp.pptx
@@ -5,7 +5,7 @@
     <p:sldMasterId id="2147483689" r:id="rId1"/>
   </p:sldMasterIdLst>
   <p:notesMasterIdLst>
-    <p:notesMasterId r:id="rId14"/>
+    <p:notesMasterId r:id="rId16"/>
   </p:notesMasterIdLst>
   <p:sldIdLst>
     <p:sldId id="256" r:id="rId2"/>
@@ -18,8 +18,10 @@
     <p:sldId id="262" r:id="rId9"/>
     <p:sldId id="265" r:id="rId10"/>
     <p:sldId id="266" r:id="rId11"/>
-    <p:sldId id="260" r:id="rId12"/>
-    <p:sldId id="267" r:id="rId13"/>
+    <p:sldId id="269" r:id="rId12"/>
+    <p:sldId id="260" r:id="rId13"/>
+    <p:sldId id="267" r:id="rId14"/>
+    <p:sldId id="268" r:id="rId15"/>
   </p:sldIdLst>
   <p:sldSz cx="12192000" cy="6858000"/>
   <p:notesSz cx="6858000" cy="9144000"/>
@@ -208,7 +210,7 @@
           <a:p>
             <a:fld id="{AA139F5D-FCEB-4534-99AC-8CD0F9E0A06F}" type="datetimeFigureOut">
               <a:rPr lang="en-US" smtClean="0"/>
-              <a:t>2/8/2018</a:t>
+              <a:t>2/9/2018</a:t>
             </a:fld>
             <a:endParaRPr lang="en-US"/>
           </a:p>
@@ -672,7 +674,7 @@
           <a:p>
             <a:fld id="{E633BF23-5A0D-4140-8F65-2D6DFEB09403}" type="datetimeFigureOut">
               <a:rPr lang="en-US" smtClean="0"/>
-              <a:t>2/8/2018</a:t>
+              <a:t>2/9/2018</a:t>
             </a:fld>
             <a:endParaRPr lang="en-US"/>
           </a:p>
@@ -893,7 +895,7 @@
           <a:p>
             <a:fld id="{E633BF23-5A0D-4140-8F65-2D6DFEB09403}" type="datetimeFigureOut">
               <a:rPr lang="en-US" smtClean="0"/>
-              <a:t>2/8/2018</a:t>
+              <a:t>2/9/2018</a:t>
             </a:fld>
             <a:endParaRPr lang="en-US"/>
           </a:p>
@@ -1073,7 +1075,7 @@
           <a:p>
             <a:fld id="{E633BF23-5A0D-4140-8F65-2D6DFEB09403}" type="datetimeFigureOut">
               <a:rPr lang="en-US" smtClean="0"/>
-              <a:t>2/8/2018</a:t>
+              <a:t>2/9/2018</a:t>
             </a:fld>
             <a:endParaRPr lang="en-US"/>
           </a:p>
@@ -1243,7 +1245,7 @@
           <a:p>
             <a:fld id="{E633BF23-5A0D-4140-8F65-2D6DFEB09403}" type="datetimeFigureOut">
               <a:rPr lang="en-US" smtClean="0"/>
-              <a:t>2/8/2018</a:t>
+              <a:t>2/9/2018</a:t>
             </a:fld>
             <a:endParaRPr lang="en-US"/>
           </a:p>
@@ -1494,7 +1496,7 @@
           <a:p>
             <a:fld id="{E633BF23-5A0D-4140-8F65-2D6DFEB09403}" type="datetimeFigureOut">
               <a:rPr lang="en-US" smtClean="0"/>
-              <a:t>2/8/2018</a:t>
+              <a:t>2/9/2018</a:t>
             </a:fld>
             <a:endParaRPr lang="en-US"/>
           </a:p>
@@ -1817,7 +1819,7 @@
           <a:p>
             <a:fld id="{E633BF23-5A0D-4140-8F65-2D6DFEB09403}" type="datetimeFigureOut">
               <a:rPr lang="en-US" smtClean="0"/>
-              <a:t>2/8/2018</a:t>
+              <a:t>2/9/2018</a:t>
             </a:fld>
             <a:endParaRPr lang="en-US"/>
           </a:p>
@@ -2241,7 +2243,7 @@
           <a:p>
             <a:fld id="{E633BF23-5A0D-4140-8F65-2D6DFEB09403}" type="datetimeFigureOut">
               <a:rPr lang="en-US" smtClean="0"/>
-              <a:t>2/8/2018</a:t>
+              <a:t>2/9/2018</a:t>
             </a:fld>
             <a:endParaRPr lang="en-US"/>
           </a:p>
@@ -2359,7 +2361,7 @@
           <a:p>
             <a:fld id="{E633BF23-5A0D-4140-8F65-2D6DFEB09403}" type="datetimeFigureOut">
               <a:rPr lang="en-US" smtClean="0"/>
-              <a:t>2/8/2018</a:t>
+              <a:t>2/9/2018</a:t>
             </a:fld>
             <a:endParaRPr lang="en-US"/>
           </a:p>
@@ -2454,7 +2456,7 @@
           <a:p>
             <a:fld id="{E633BF23-5A0D-4140-8F65-2D6DFEB09403}" type="datetimeFigureOut">
               <a:rPr lang="en-US" smtClean="0"/>
-              <a:t>2/8/2018</a:t>
+              <a:t>2/9/2018</a:t>
             </a:fld>
             <a:endParaRPr lang="en-US"/>
           </a:p>
@@ -2744,7 +2746,7 @@
           <a:p>
             <a:fld id="{E633BF23-5A0D-4140-8F65-2D6DFEB09403}" type="datetimeFigureOut">
               <a:rPr lang="en-US" smtClean="0"/>
-              <a:t>2/8/2018</a:t>
+              <a:t>2/9/2018</a:t>
             </a:fld>
             <a:endParaRPr lang="en-US"/>
           </a:p>
@@ -3016,7 +3018,7 @@
           <a:p>
             <a:fld id="{E633BF23-5A0D-4140-8F65-2D6DFEB09403}" type="datetimeFigureOut">
               <a:rPr lang="en-US" smtClean="0"/>
-              <a:t>2/8/2018</a:t>
+              <a:t>2/9/2018</a:t>
             </a:fld>
             <a:endParaRPr lang="en-US"/>
           </a:p>
@@ -3270,7 +3272,7 @@
           <a:p>
             <a:fld id="{E633BF23-5A0D-4140-8F65-2D6DFEB09403}" type="datetimeFigureOut">
               <a:rPr lang="en-US" smtClean="0"/>
-              <a:t>2/8/2018</a:t>
+              <a:t>2/9/2018</a:t>
             </a:fld>
             <a:endParaRPr lang="en-US"/>
           </a:p>
@@ -3997,6 +3999,82 @@
           <a:lstStyle/>
           <a:p>
             <a:r>
+              <a:rPr lang="nl-NL" dirty="0" smtClean="0"/>
+              <a:t>Example Cluster Setup</a:t>
+            </a:r>
+            <a:endParaRPr lang="nl-NL" dirty="0"/>
+          </a:p>
+        </p:txBody>
+      </p:sp>
+      <p:sp>
+        <p:nvSpPr>
+          <p:cNvPr id="3" name="Content Placeholder 2"/>
+          <p:cNvSpPr>
+            <a:spLocks noGrp="1"/>
+          </p:cNvSpPr>
+          <p:nvPr>
+            <p:ph idx="1"/>
+          </p:nvPr>
+        </p:nvSpPr>
+        <p:spPr/>
+        <p:txBody>
+          <a:bodyPr/>
+          <a:lstStyle/>
+          <a:p>
+            <a:r>
+              <a:rPr lang="nl-NL" dirty="0" smtClean="0"/>
+              <a:t>TODO</a:t>
+            </a:r>
+            <a:endParaRPr lang="nl-NL" dirty="0"/>
+          </a:p>
+        </p:txBody>
+      </p:sp>
+    </p:spTree>
+    <p:extLst>
+      <p:ext uri="{BB962C8B-B14F-4D97-AF65-F5344CB8AC3E}">
+        <p14:creationId xmlns:p14="http://schemas.microsoft.com/office/powerpoint/2010/main" val="3143597932"/>
+      </p:ext>
+    </p:extLst>
+  </p:cSld>
+  <p:clrMapOvr>
+    <a:masterClrMapping/>
+  </p:clrMapOvr>
+</p:sld>
+</file>
+
+<file path=ppt/slides/slide12.xml><?xml version="1.0" encoding="utf-8"?>
+<p:sld xmlns:a="http://schemas.openxmlformats.org/drawingml/2006/main" xmlns:r="http://schemas.openxmlformats.org/officeDocument/2006/relationships" xmlns:p="http://schemas.openxmlformats.org/presentationml/2006/main">
+  <p:cSld>
+    <p:spTree>
+      <p:nvGrpSpPr>
+        <p:cNvPr id="1" name=""/>
+        <p:cNvGrpSpPr/>
+        <p:nvPr/>
+      </p:nvGrpSpPr>
+      <p:grpSpPr>
+        <a:xfrm>
+          <a:off x="0" y="0"/>
+          <a:ext cx="0" cy="0"/>
+          <a:chOff x="0" y="0"/>
+          <a:chExt cx="0" cy="0"/>
+        </a:xfrm>
+      </p:grpSpPr>
+      <p:sp>
+        <p:nvSpPr>
+          <p:cNvPr id="2" name="Title 1"/>
+          <p:cNvSpPr>
+            <a:spLocks noGrp="1"/>
+          </p:cNvSpPr>
+          <p:nvPr>
+            <p:ph type="title"/>
+          </p:nvPr>
+        </p:nvSpPr>
+        <p:spPr/>
+        <p:txBody>
+          <a:bodyPr/>
+          <a:lstStyle/>
+          <a:p>
+            <a:r>
               <a:rPr lang="en-US" dirty="0" smtClean="0"/>
               <a:t>Tips</a:t>
             </a:r>
@@ -4058,11 +4136,7 @@
             <a:pPr lvl="1"/>
             <a:r>
               <a:rPr lang="en-US" dirty="0" smtClean="0"/>
-              <a:t>Use RDDs only if you need low-level </a:t>
-            </a:r>
-            <a:r>
-              <a:rPr lang="en-US" dirty="0" smtClean="0"/>
-              <a:t>transformations / control</a:t>
+              <a:t>Use RDDs only if you need low-level transformations / control</a:t>
             </a:r>
             <a:endParaRPr lang="en-US" dirty="0"/>
           </a:p>
@@ -4076,26 +4150,26 @@
             <a:pPr lvl="1"/>
             <a:r>
               <a:rPr lang="en-US" dirty="0" smtClean="0"/>
-              <a:t>Running on port </a:t>
-            </a:r>
-            <a:r>
-              <a:rPr lang="en-US" dirty="0" smtClean="0"/>
-              <a:t>4040</a:t>
+              <a:t>Running on port 4040</a:t>
             </a:r>
             <a:endParaRPr lang="en-GB" dirty="0"/>
           </a:p>
           <a:p>
             <a:r>
-              <a:rPr lang="en-GB" dirty="0" smtClean="0"/>
+              <a:rPr lang="en-GB" u="sng" dirty="0" smtClean="0"/>
               <a:t>Do </a:t>
             </a:r>
             <a:r>
-              <a:rPr lang="en-GB" b="1" dirty="0" smtClean="0"/>
+              <a:rPr lang="en-GB" b="1" u="sng" dirty="0" smtClean="0"/>
               <a:t>NOT</a:t>
             </a:r>
             <a:r>
-              <a:rPr lang="en-GB" dirty="0" smtClean="0"/>
-              <a:t> use Spark 1.6 or lower, only use the latest version, be mindful of online tutorials that still use Spark 1.6 or older.</a:t>
+              <a:rPr lang="en-GB" u="sng" dirty="0" smtClean="0"/>
+              <a:t> use Spark 1.6 or lower</a:t>
+            </a:r>
+            <a:r>
+              <a:rPr lang="en-GB" dirty="0" smtClean="0"/>
+              <a:t>, only use the latest version, be mindful of online tutorials that still use Spark 1.6 or older.</a:t>
             </a:r>
           </a:p>
           <a:p>
@@ -4152,7 +4226,7 @@
 </p:sld>
 </file>
 
-<file path=ppt/slides/slide12.xml><?xml version="1.0" encoding="utf-8"?>
+<file path=ppt/slides/slide13.xml><?xml version="1.0" encoding="utf-8"?>
 <p:sld xmlns:a="http://schemas.openxmlformats.org/drawingml/2006/main" xmlns:r="http://schemas.openxmlformats.org/officeDocument/2006/relationships" xmlns:p="http://schemas.openxmlformats.org/presentationml/2006/main">
   <p:cSld>
     <p:spTree>
@@ -4322,6 +4396,114 @@
     <p:extLst>
       <p:ext uri="{BB962C8B-B14F-4D97-AF65-F5344CB8AC3E}">
         <p14:creationId xmlns:p14="http://schemas.microsoft.com/office/powerpoint/2010/main" val="708177791"/>
+      </p:ext>
+    </p:extLst>
+  </p:cSld>
+  <p:clrMapOvr>
+    <a:masterClrMapping/>
+  </p:clrMapOvr>
+</p:sld>
+</file>
+
+<file path=ppt/slides/slide14.xml><?xml version="1.0" encoding="utf-8"?>
+<p:sld xmlns:a="http://schemas.openxmlformats.org/drawingml/2006/main" xmlns:r="http://schemas.openxmlformats.org/officeDocument/2006/relationships" xmlns:p="http://schemas.openxmlformats.org/presentationml/2006/main">
+  <p:cSld>
+    <p:spTree>
+      <p:nvGrpSpPr>
+        <p:cNvPr id="1" name=""/>
+        <p:cNvGrpSpPr/>
+        <p:nvPr/>
+      </p:nvGrpSpPr>
+      <p:grpSpPr>
+        <a:xfrm>
+          <a:off x="0" y="0"/>
+          <a:ext cx="0" cy="0"/>
+          <a:chOff x="0" y="0"/>
+          <a:chExt cx="0" cy="0"/>
+        </a:xfrm>
+      </p:grpSpPr>
+      <p:sp>
+        <p:nvSpPr>
+          <p:cNvPr id="2" name="Title 1"/>
+          <p:cNvSpPr>
+            <a:spLocks noGrp="1"/>
+          </p:cNvSpPr>
+          <p:nvPr>
+            <p:ph type="title"/>
+          </p:nvPr>
+        </p:nvSpPr>
+        <p:spPr/>
+        <p:txBody>
+          <a:bodyPr/>
+          <a:lstStyle/>
+          <a:p>
+            <a:r>
+              <a:rPr lang="nl-NL" dirty="0" smtClean="0"/>
+              <a:t>Troubleshooting	</a:t>
+            </a:r>
+            <a:endParaRPr lang="nl-NL" dirty="0"/>
+          </a:p>
+        </p:txBody>
+      </p:sp>
+      <p:sp>
+        <p:nvSpPr>
+          <p:cNvPr id="3" name="Content Placeholder 2"/>
+          <p:cNvSpPr>
+            <a:spLocks noGrp="1"/>
+          </p:cNvSpPr>
+          <p:nvPr>
+            <p:ph idx="1"/>
+          </p:nvPr>
+        </p:nvSpPr>
+        <p:spPr/>
+        <p:txBody>
+          <a:bodyPr/>
+          <a:lstStyle/>
+          <a:p>
+            <a:r>
+              <a:rPr lang="nl-NL" dirty="0" smtClean="0"/>
+              <a:t>If you cannot import the project as an SBT project, you are either missing the Scala plugin, or the </a:t>
+            </a:r>
+            <a:r>
+              <a:rPr lang="nl-NL" u="sng" dirty="0" smtClean="0"/>
+              <a:t>Scala plugin </a:t>
+            </a:r>
+            <a:r>
+              <a:rPr lang="nl-NL" dirty="0" smtClean="0"/>
+              <a:t>is out of date. Make sure you also use the </a:t>
+            </a:r>
+            <a:r>
+              <a:rPr lang="nl-NL" u="sng" dirty="0" smtClean="0"/>
+              <a:t>latest version of IntelliJ</a:t>
+            </a:r>
+          </a:p>
+          <a:p>
+            <a:endParaRPr lang="nl-NL" dirty="0"/>
+          </a:p>
+          <a:p>
+            <a:r>
+              <a:rPr lang="nl-NL" dirty="0"/>
+              <a:t>In case you get a </a:t>
+            </a:r>
+            <a:r>
+              <a:rPr lang="nl-NL" b="1" dirty="0" smtClean="0"/>
+              <a:t>ClassNotFoundException</a:t>
+            </a:r>
+            <a:r>
+              <a:rPr lang="nl-NL" dirty="0" smtClean="0"/>
+              <a:t> when </a:t>
+            </a:r>
+            <a:r>
+              <a:rPr lang="nl-NL" dirty="0"/>
+              <a:t>running “SparkExampleMain”, try updating and/or restarting IntelliJ</a:t>
+            </a:r>
+          </a:p>
+        </p:txBody>
+      </p:sp>
+    </p:spTree>
+    <p:extLst>
+      <p:ext uri="{BB962C8B-B14F-4D97-AF65-F5344CB8AC3E}">
+        <p14:creationId xmlns:p14="http://schemas.microsoft.com/office/powerpoint/2010/main" val="4027043143"/>
       </p:ext>
     </p:extLst>
   </p:cSld>
@@ -4409,7 +4591,6 @@
               <a:rPr lang="en-US" dirty="0" smtClean="0"/>
               <a:t> </a:t>
             </a:r>
-            <a:endParaRPr lang="en-US" dirty="0" smtClean="0"/>
           </a:p>
           <a:p>
             <a:pPr lvl="1"/>
@@ -4479,15 +4660,7 @@
             <a:pPr lvl="1"/>
             <a:r>
               <a:rPr lang="en-US" dirty="0" smtClean="0"/>
-              <a:t>Be mindful of operations that force writing to </a:t>
-            </a:r>
-            <a:r>
-              <a:rPr lang="en-US" dirty="0" smtClean="0"/>
-              <a:t>disk </a:t>
-            </a:r>
-            <a:r>
-              <a:rPr lang="en-US" dirty="0" smtClean="0"/>
-              <a:t>e.g. shuffle</a:t>
+              <a:t>Be mindful of operations that force writing to disk e.g. shuffle</a:t>
             </a:r>
           </a:p>
           <a:p>
@@ -4717,13 +4890,8 @@
             <a:pPr lvl="1"/>
             <a:r>
               <a:rPr lang="en-US" dirty="0" smtClean="0"/>
-              <a:t>Started from </a:t>
-            </a:r>
-            <a:r>
-              <a:rPr lang="en-US" dirty="0" smtClean="0"/>
-              <a:t>(Scala/Java/Python) code</a:t>
-            </a:r>
-            <a:endParaRPr lang="en-US" dirty="0" smtClean="0"/>
+              <a:t>Started from (Scala/Java/Python) code</a:t>
+            </a:r>
           </a:p>
           <a:p>
             <a:r>
@@ -4746,26 +4914,14 @@
             <a:pPr lvl="2"/>
             <a:r>
               <a:rPr lang="en-US" dirty="0" smtClean="0"/>
-              <a:t>Your program is expected to run on </a:t>
-            </a:r>
+              <a:t>Your program is expected to run on a cluster for the final demo</a:t>
+            </a:r>
+          </a:p>
+          <a:p>
+            <a:pPr lvl="1"/>
             <a:r>
               <a:rPr lang="en-US" dirty="0" smtClean="0"/>
-              <a:t>a </a:t>
-            </a:r>
-            <a:r>
-              <a:rPr lang="en-US" dirty="0" smtClean="0"/>
-              <a:t>cluster for the final demo</a:t>
-            </a:r>
-          </a:p>
-          <a:p>
-            <a:pPr lvl="1"/>
-            <a:r>
-              <a:rPr lang="en-US" dirty="0" smtClean="0"/>
-              <a:t>Different cluster manager </a:t>
-            </a:r>
-            <a:r>
-              <a:rPr lang="en-US" dirty="0" smtClean="0"/>
-              <a:t>modes</a:t>
+              <a:t>Different cluster manager modes</a:t>
             </a:r>
             <a:r>
               <a:rPr lang="en-US" baseline="30000" dirty="0" smtClean="0"/>
@@ -4780,11 +4936,7 @@
             <a:pPr lvl="2"/>
             <a:r>
               <a:rPr lang="en-US" dirty="0" smtClean="0"/>
-              <a:t>Standalone, easiest to </a:t>
-            </a:r>
-            <a:r>
-              <a:rPr lang="en-US" dirty="0" smtClean="0"/>
-              <a:t>set-up: </a:t>
+              <a:t>Standalone, easiest to set-up: </a:t>
             </a:r>
             <a:r>
               <a:rPr lang="en-US" dirty="0">
@@ -4802,7 +4954,6 @@
               <a:rPr lang="en-US" dirty="0" smtClean="0"/>
               <a:t> </a:t>
             </a:r>
-            <a:endParaRPr lang="en-US" dirty="0" smtClean="0"/>
           </a:p>
           <a:p>
             <a:pPr lvl="2"/>
@@ -5121,11 +5272,7 @@
             <a:pPr lvl="1"/>
             <a:r>
               <a:rPr lang="en-US" dirty="0" smtClean="0"/>
-              <a:t>Scala is recommended, as it is native to </a:t>
-            </a:r>
-            <a:r>
-              <a:rPr lang="en-US" dirty="0" smtClean="0"/>
-              <a:t>Spark</a:t>
+              <a:t>Scala is recommended, as it is native to Spark</a:t>
             </a:r>
             <a:endParaRPr lang="en-GB" dirty="0"/>
           </a:p>
@@ -5159,11 +5306,7 @@
             <a:pPr lvl="1"/>
             <a:r>
               <a:rPr lang="en-GB" dirty="0" smtClean="0"/>
-              <a:t>In Spark Cluster, as many workers as yo</a:t>
-            </a:r>
-            <a:r>
-              <a:rPr lang="en-GB" dirty="0" smtClean="0"/>
-              <a:t>u have nodes to deploy them on</a:t>
+              <a:t>In Spark Cluster, as many workers as you have nodes to deploy them on</a:t>
             </a:r>
             <a:endParaRPr lang="en-US" dirty="0" smtClean="0"/>
           </a:p>
@@ -5256,7 +5399,7 @@
         <p:spPr/>
         <p:txBody>
           <a:bodyPr>
-            <a:normAutofit lnSpcReduction="10000"/>
+            <a:normAutofit fontScale="92500" lnSpcReduction="10000"/>
           </a:bodyPr>
           <a:lstStyle/>
           <a:p>
@@ -5329,6 +5472,13 @@
               <a:rPr lang="en-US" dirty="0" smtClean="0"/>
               <a:t>address</a:t>
             </a:r>
+          </a:p>
+          <a:p>
+            <a:pPr lvl="1"/>
+            <a:r>
+              <a:rPr lang="en-US" dirty="0" smtClean="0"/>
+              <a:t>Make sure to install the Scala Plugin in IntelliJ</a:t>
+            </a:r>
             <a:endParaRPr lang="en-US" dirty="0"/>
           </a:p>
           <a:p>
@@ -5371,7 +5521,6 @@
               <a:rPr lang="en-US" dirty="0" smtClean="0"/>
               <a:t> </a:t>
             </a:r>
-            <a:endParaRPr lang="en-US" dirty="0" smtClean="0"/>
           </a:p>
           <a:p>
             <a:pPr lvl="1"/>
@@ -5444,11 +5593,7 @@
             </a:r>
             <a:r>
               <a:rPr lang="en-GB" dirty="0" smtClean="0"/>
-              <a:t>/app), follow instructions in the console, and </a:t>
-            </a:r>
-            <a:r>
-              <a:rPr lang="en-GB" smtClean="0"/>
-              <a:t>explore the code</a:t>
+              <a:t>/app), follow instructions in the console, and explore the code</a:t>
             </a:r>
             <a:endParaRPr lang="en-US" u="sng" dirty="0" smtClean="0"/>
           </a:p>

</xml_diff>